<commit_message>
UPDATED-> poniendo los json que tiene cada pantalla
</commit_message>
<xml_diff>
--- a/docs/detalle-compra.pptx
+++ b/docs/detalle-compra.pptx
@@ -4002,10 +4002,10 @@
       </p:sp>
       <p:sp>
         <p:nvSpPr>
-          <p:cNvPr id="12" name="CuadroTexto 11">
-            <a:extLst>
-              <a:ext uri="{FF2B5EF4-FFF2-40B4-BE49-F238E27FC236}">
-                <a16:creationId xmlns:a16="http://schemas.microsoft.com/office/drawing/2014/main" id="{5F5B7E43-DF5A-D344-A8F8-1A3EF00AEE32}"/>
+          <p:cNvPr id="13" name="CuadroTexto 12">
+            <a:extLst>
+              <a:ext uri="{FF2B5EF4-FFF2-40B4-BE49-F238E27FC236}">
+                <a16:creationId xmlns:a16="http://schemas.microsoft.com/office/drawing/2014/main" id="{08A881F9-63A7-414F-9625-EE878BF46551}"/>
               </a:ext>
             </a:extLst>
           </p:cNvPr>
@@ -4014,8 +4014,8 @@
         </p:nvSpPr>
         <p:spPr>
           <a:xfrm>
-            <a:off x="6543613" y="660515"/>
-            <a:ext cx="742511" cy="246221"/>
+            <a:off x="6454713" y="1815704"/>
+            <a:ext cx="5225097" cy="1631216"/>
           </a:xfrm>
           <a:prstGeom prst="rect">
             <a:avLst/>
@@ -4023,24 +4023,88 @@
           <a:noFill/>
         </p:spPr>
         <p:txBody>
-          <a:bodyPr vert="horz" wrap="none" rtlCol="0" anchor="ctr" anchorCtr="0">
+          <a:bodyPr vert="horz" wrap="square" rtlCol="0" anchor="ctr" anchorCtr="0">
             <a:spAutoFit/>
           </a:bodyPr>
           <a:lstStyle/>
           <a:p>
             <a:r>
               <a:rPr lang="es-MX" sz="1000" dirty="0"/>
+              <a:t>Notas:</a:t>
+            </a:r>
+          </a:p>
+          <a:p>
+            <a:pPr marL="228600" indent="-228600">
+              <a:buAutoNum type="alphaLcParenR"/>
+            </a:pPr>
+            <a:r>
+              <a:rPr lang="es-MX" sz="1000" dirty="0"/>
+              <a:t>Metodo de pago:  1-&gt; tarjeta, 2-&gt; transferencia bancaria</a:t>
+            </a:r>
+          </a:p>
+          <a:p>
+            <a:pPr marL="228600" indent="-228600">
+              <a:buAutoNum type="alphaLcParenR"/>
+            </a:pPr>
+            <a:r>
+              <a:rPr lang="es-MX" sz="1000" dirty="0"/>
+              <a:t>Elije tarjeta: “master”, “visa”, “amex”</a:t>
+            </a:r>
+          </a:p>
+          <a:p>
+            <a:pPr marL="228600" indent="-228600">
+              <a:buAutoNum type="alphaLcParenR"/>
+            </a:pPr>
+            <a:endParaRPr lang="es-MX" sz="1000" dirty="0"/>
+          </a:p>
+          <a:p>
+            <a:r>
+              <a:rPr lang="es-MX" sz="1000" dirty="0"/>
               <a:t>Preguntas:</a:t>
             </a:r>
           </a:p>
-        </p:txBody>
-      </p:sp>
-      <p:sp>
-        <p:nvSpPr>
-          <p:cNvPr id="13" name="CuadroTexto 12">
-            <a:extLst>
-              <a:ext uri="{FF2B5EF4-FFF2-40B4-BE49-F238E27FC236}">
-                <a16:creationId xmlns:a16="http://schemas.microsoft.com/office/drawing/2014/main" id="{08A881F9-63A7-414F-9625-EE878BF46551}"/>
+          <a:p>
+            <a:r>
+              <a:rPr lang="es-MX" sz="1000" dirty="0"/>
+              <a:t>¿cómo se obtiene el tiempo estimado de llegada?  </a:t>
+            </a:r>
+          </a:p>
+          <a:p>
+            <a:r>
+              <a:rPr lang="es-MX" sz="1000" dirty="0"/>
+              <a:t>Los datos del metodo de pago ¿llegan hasta el back? ¿es un gateway de pagos?</a:t>
+            </a:r>
+          </a:p>
+          <a:p>
+            <a:endParaRPr lang="es-MX" sz="1000" dirty="0"/>
+          </a:p>
+          <a:p>
+            <a:r>
+              <a:rPr lang="es-MX" sz="1000" dirty="0"/>
+              <a:t>Si son varios productos ¿cómo obtienes el detalle del producto?, según elijas en la </a:t>
+            </a:r>
+            <a:r>
+              <a:rPr lang="es-MX" sz="1000"/>
+              <a:t>segunda sección </a:t>
+            </a:r>
+            <a:r>
+              <a:rPr lang="es-MX" sz="1000" dirty="0"/>
+              <a:t>se actualiza la info de la </a:t>
+            </a:r>
+            <a:r>
+              <a:rPr lang="es-MX" sz="1000"/>
+              <a:t>primera sección </a:t>
+            </a:r>
+            <a:endParaRPr lang="es-MX" sz="1000" dirty="0"/>
+          </a:p>
+        </p:txBody>
+      </p:sp>
+      <p:sp>
+        <p:nvSpPr>
+          <p:cNvPr id="14" name="CuadroTexto 13">
+            <a:extLst>
+              <a:ext uri="{FF2B5EF4-FFF2-40B4-BE49-F238E27FC236}">
+                <a16:creationId xmlns:a16="http://schemas.microsoft.com/office/drawing/2014/main" id="{67190E97-D9D3-144A-9DDF-2FDE639EAE17}"/>
               </a:ext>
             </a:extLst>
           </p:cNvPr>
@@ -4049,8 +4113,8 @@
         </p:nvSpPr>
         <p:spPr>
           <a:xfrm>
-            <a:off x="6454713" y="2046536"/>
-            <a:ext cx="5225097" cy="1169551"/>
+            <a:off x="6344066" y="5698965"/>
+            <a:ext cx="5225097" cy="553998"/>
           </a:xfrm>
           <a:prstGeom prst="rect">
             <a:avLst/>
@@ -4065,49 +4129,19 @@
           <a:p>
             <a:r>
               <a:rPr lang="es-MX" sz="1000" dirty="0"/>
-              <a:t>Notas:</a:t>
-            </a:r>
-          </a:p>
-          <a:p>
-            <a:pPr marL="228600" indent="-228600">
-              <a:buAutoNum type="alphaLcParenR"/>
-            </a:pPr>
+              <a:t>JSON:</a:t>
+            </a:r>
+          </a:p>
+          <a:p>
             <a:r>
               <a:rPr lang="es-MX" sz="1000" dirty="0"/>
-              <a:t>Metodo de pago:  1-&gt; tarjeta, 2-&gt; transferencia bancaria</a:t>
-            </a:r>
-          </a:p>
-          <a:p>
-            <a:pPr marL="228600" indent="-228600">
-              <a:buAutoNum type="alphaLcParenR"/>
-            </a:pPr>
+              <a:t>detalle-producto</a:t>
+            </a:r>
+          </a:p>
+          <a:p>
             <a:r>
               <a:rPr lang="es-MX" sz="1000" dirty="0"/>
-              <a:t>Elije tarjeta: “master”, “visa”, “amex”</a:t>
-            </a:r>
-          </a:p>
-          <a:p>
-            <a:pPr marL="228600" indent="-228600">
-              <a:buAutoNum type="alphaLcParenR"/>
-            </a:pPr>
-            <a:endParaRPr lang="es-MX" sz="1000" dirty="0"/>
-          </a:p>
-          <a:p>
-            <a:r>
-              <a:rPr lang="es-MX" sz="1000" dirty="0"/>
-              <a:t>Preguntas:</a:t>
-            </a:r>
-          </a:p>
-          <a:p>
-            <a:r>
-              <a:rPr lang="es-MX" sz="1000" dirty="0"/>
-              <a:t>¿cómo se obtiene el tiempo estimado de llegada?  </a:t>
-            </a:r>
-          </a:p>
-          <a:p>
-            <a:r>
-              <a:rPr lang="es-MX" sz="1000" dirty="0"/>
-              <a:t>Los datos del metodo de pago ¿llegan hasta el back? ¿es un gateway de pagos?</a:t>
+              <a:t>completa-compra</a:t>
             </a:r>
           </a:p>
         </p:txBody>

</xml_diff>